<commit_message>
Changed the stroop to a LIO based setup
</commit_message>
<xml_diff>
--- a/docs/stroop/images/images_en.pptx
+++ b/docs/stroop/images/images_en.pptx
@@ -1686,10 +1686,51 @@
       </p:grpSpPr>
       <p:sp>
         <p:nvSpPr>
-          <p:cNvPr id="2" name="Oval 1">
+          <p:cNvPr id="7" name="TextBox 6">
             <a:extLst>
               <a:ext uri="{FF2B5EF4-FFF2-40B4-BE49-F238E27FC236}">
-                <a16:creationId xmlns:a16="http://schemas.microsoft.com/office/drawing/2014/main" id="{65B12D9A-2B14-6F78-E725-7B5811F462BC}"/>
+                <a16:creationId xmlns:a16="http://schemas.microsoft.com/office/drawing/2014/main" id="{72272CE1-E739-FDA7-3DE8-0908A2ED6630}"/>
+              </a:ext>
+            </a:extLst>
+          </p:cNvPr>
+          <p:cNvSpPr txBox="1"/>
+          <p:nvPr/>
+        </p:nvSpPr>
+        <p:spPr>
+          <a:xfrm>
+            <a:off x="1660338" y="563427"/>
+            <a:ext cx="9322189" cy="830997"/>
+          </a:xfrm>
+          <a:prstGeom prst="rect">
+            <a:avLst/>
+          </a:prstGeom>
+          <a:noFill/>
+        </p:spPr>
+        <p:txBody>
+          <a:bodyPr wrap="square" rtlCol="0">
+            <a:spAutoFit/>
+          </a:bodyPr>
+          <a:lstStyle/>
+          <a:p>
+            <a:pPr algn="ctr"/>
+            <a:r>
+              <a:rPr lang="en-GB" sz="2400" dirty="0"/>
+              <a:t>You will see a series of squares in red, green, blue or yellow. Press the button that correspond to the colour of </a:t>
+            </a:r>
+            <a:r>
+              <a:rPr lang="en-GB" sz="2400"/>
+              <a:t>the square.</a:t>
+            </a:r>
+            <a:endParaRPr lang="en-DK" sz="2400" dirty="0"/>
+          </a:p>
+        </p:txBody>
+      </p:sp>
+      <p:sp>
+        <p:nvSpPr>
+          <p:cNvPr id="3" name="Oval 2">
+            <a:extLst>
+              <a:ext uri="{FF2B5EF4-FFF2-40B4-BE49-F238E27FC236}">
+                <a16:creationId xmlns:a16="http://schemas.microsoft.com/office/drawing/2014/main" id="{85609228-FA48-0048-4B3B-C470B4A2739B}"/>
               </a:ext>
             </a:extLst>
           </p:cNvPr>
@@ -1735,7 +1776,7 @@
                   <a:schemeClr val="tx1"/>
                 </a:solidFill>
               </a:rPr>
-              <a:t>1</a:t>
+              <a:t>3</a:t>
             </a:r>
             <a:endParaRPr lang="en-DK" dirty="0">
               <a:solidFill>
@@ -1747,10 +1788,10 @@
       </p:sp>
       <p:sp>
         <p:nvSpPr>
-          <p:cNvPr id="4" name="Oval 3">
+          <p:cNvPr id="8" name="Oval 7">
             <a:extLst>
               <a:ext uri="{FF2B5EF4-FFF2-40B4-BE49-F238E27FC236}">
-                <a16:creationId xmlns:a16="http://schemas.microsoft.com/office/drawing/2014/main" id="{68D72EAD-5A81-DEF9-CF33-3BB873E34A8E}"/>
+                <a16:creationId xmlns:a16="http://schemas.microsoft.com/office/drawing/2014/main" id="{1A077E92-C2DB-66B6-BE4F-3AE5ADF39781}"/>
               </a:ext>
             </a:extLst>
           </p:cNvPr>
@@ -1796,7 +1837,7 @@
                   <a:schemeClr val="tx1"/>
                 </a:solidFill>
               </a:rPr>
-              <a:t>2</a:t>
+              <a:t>4</a:t>
             </a:r>
             <a:endParaRPr lang="en-DK" dirty="0">
               <a:solidFill>
@@ -1808,10 +1849,10 @@
       </p:sp>
       <p:sp>
         <p:nvSpPr>
-          <p:cNvPr id="5" name="Oval 4">
+          <p:cNvPr id="9" name="Oval 8">
             <a:extLst>
               <a:ext uri="{FF2B5EF4-FFF2-40B4-BE49-F238E27FC236}">
-                <a16:creationId xmlns:a16="http://schemas.microsoft.com/office/drawing/2014/main" id="{09666C76-F85D-0F4A-7CDF-E1061BD1A91E}"/>
+                <a16:creationId xmlns:a16="http://schemas.microsoft.com/office/drawing/2014/main" id="{C3EE3612-A434-5D49-786C-189B8865D17B}"/>
               </a:ext>
             </a:extLst>
           </p:cNvPr>
@@ -1854,7 +1895,7 @@
                   <a:schemeClr val="tx1"/>
                 </a:solidFill>
               </a:rPr>
-              <a:t>3</a:t>
+              <a:t>1</a:t>
             </a:r>
             <a:endParaRPr lang="en-DK" dirty="0">
               <a:solidFill>
@@ -1866,10 +1907,10 @@
       </p:sp>
       <p:sp>
         <p:nvSpPr>
-          <p:cNvPr id="6" name="Oval 5">
+          <p:cNvPr id="10" name="Oval 9">
             <a:extLst>
               <a:ext uri="{FF2B5EF4-FFF2-40B4-BE49-F238E27FC236}">
-                <a16:creationId xmlns:a16="http://schemas.microsoft.com/office/drawing/2014/main" id="{5BB06849-C76D-0FB7-09DC-B8687A73F972}"/>
+                <a16:creationId xmlns:a16="http://schemas.microsoft.com/office/drawing/2014/main" id="{92EB3F72-8DEE-AB6D-1209-934BDB9E9B00}"/>
               </a:ext>
             </a:extLst>
           </p:cNvPr>
@@ -1915,54 +1956,13 @@
                   <a:schemeClr val="bg1"/>
                 </a:solidFill>
               </a:rPr>
-              <a:t>4</a:t>
+              <a:t>2</a:t>
             </a:r>
             <a:endParaRPr lang="en-DK" dirty="0">
               <a:solidFill>
                 <a:schemeClr val="bg1"/>
               </a:solidFill>
             </a:endParaRPr>
-          </a:p>
-        </p:txBody>
-      </p:sp>
-      <p:sp>
-        <p:nvSpPr>
-          <p:cNvPr id="7" name="TextBox 6">
-            <a:extLst>
-              <a:ext uri="{FF2B5EF4-FFF2-40B4-BE49-F238E27FC236}">
-                <a16:creationId xmlns:a16="http://schemas.microsoft.com/office/drawing/2014/main" id="{72272CE1-E739-FDA7-3DE8-0908A2ED6630}"/>
-              </a:ext>
-            </a:extLst>
-          </p:cNvPr>
-          <p:cNvSpPr txBox="1"/>
-          <p:nvPr/>
-        </p:nvSpPr>
-        <p:spPr>
-          <a:xfrm>
-            <a:off x="1660338" y="563427"/>
-            <a:ext cx="9322189" cy="830997"/>
-          </a:xfrm>
-          <a:prstGeom prst="rect">
-            <a:avLst/>
-          </a:prstGeom>
-          <a:noFill/>
-        </p:spPr>
-        <p:txBody>
-          <a:bodyPr wrap="square" rtlCol="0">
-            <a:spAutoFit/>
-          </a:bodyPr>
-          <a:lstStyle/>
-          <a:p>
-            <a:pPr algn="ctr"/>
-            <a:r>
-              <a:rPr lang="en-GB" sz="2400" dirty="0"/>
-              <a:t>You will see a series of squares in red, green, blue or yellow. Press the button that correspond to the colour of </a:t>
-            </a:r>
-            <a:r>
-              <a:rPr lang="en-GB" sz="2400"/>
-              <a:t>the square.</a:t>
-            </a:r>
-            <a:endParaRPr lang="en-DK" sz="2400" dirty="0"/>
           </a:p>
         </p:txBody>
       </p:sp>

</xml_diff>